<commit_message>
Updated xtalEnergy to plot per xtal row
</commit_message>
<xml_diff>
--- a/gain_corrections_cuts_muons_meeting.pptx
+++ b/gain_corrections_cuts_muons_meeting.pptx
@@ -17,9 +17,9 @@
     <p:sldId id="316" r:id="rId5"/>
     <p:sldId id="331" r:id="rId6"/>
     <p:sldId id="344" r:id="rId7"/>
-    <p:sldId id="342" r:id="rId8"/>
-    <p:sldId id="352" r:id="rId9"/>
-    <p:sldId id="353" r:id="rId10"/>
+    <p:sldId id="353" r:id="rId8"/>
+    <p:sldId id="342" r:id="rId9"/>
+    <p:sldId id="352" r:id="rId10"/>
     <p:sldId id="341" r:id="rId11"/>
     <p:sldId id="350" r:id="rId12"/>
     <p:sldId id="345" r:id="rId13"/>
@@ -885,7 +885,7 @@
           <a:bodyPr/>
           <a:lstStyle/>
           <a:p>
-            <a:endParaRPr lang="en-US" dirty="0"/>
+            <a:endParaRPr lang="en-US"/>
           </a:p>
         </p:txBody>
       </p:sp>
@@ -906,7 +906,7 @@
           <a:p>
             <a:fld id="{78455201-7865-8744-8A9B-9F5FC03C5C4C}" type="slidenum">
               <a:rPr lang="en-US" smtClean="0"/>
-              <a:t>9</a:t>
+              <a:t>6</a:t>
             </a:fld>
             <a:endParaRPr lang="en-US"/>
           </a:p>
@@ -915,7 +915,7 @@
     </p:spTree>
     <p:extLst>
       <p:ext uri="{BB962C8B-B14F-4D97-AF65-F5344CB8AC3E}">
-        <p14:creationId xmlns:p14="http://schemas.microsoft.com/office/powerpoint/2010/main" val="3692031420"/>
+        <p14:creationId xmlns:p14="http://schemas.microsoft.com/office/powerpoint/2010/main" val="1870072505"/>
       </p:ext>
     </p:extLst>
   </p:cSld>
@@ -990,7 +990,7 @@
           <a:p>
             <a:fld id="{78455201-7865-8744-8A9B-9F5FC03C5C4C}" type="slidenum">
               <a:rPr lang="en-US" smtClean="0"/>
-              <a:t>10</a:t>
+              <a:t>9</a:t>
             </a:fld>
             <a:endParaRPr lang="en-US"/>
           </a:p>
@@ -999,7 +999,7 @@
     </p:spTree>
     <p:extLst>
       <p:ext uri="{BB962C8B-B14F-4D97-AF65-F5344CB8AC3E}">
-        <p14:creationId xmlns:p14="http://schemas.microsoft.com/office/powerpoint/2010/main" val="4080700659"/>
+        <p14:creationId xmlns:p14="http://schemas.microsoft.com/office/powerpoint/2010/main" val="3692031420"/>
       </p:ext>
     </p:extLst>
   </p:cSld>
@@ -1074,7 +1074,7 @@
           <a:p>
             <a:fld id="{78455201-7865-8744-8A9B-9F5FC03C5C4C}" type="slidenum">
               <a:rPr lang="en-US" smtClean="0"/>
-              <a:t>11</a:t>
+              <a:t>10</a:t>
             </a:fld>
             <a:endParaRPr lang="en-US"/>
           </a:p>
@@ -1083,7 +1083,7 @@
     </p:spTree>
     <p:extLst>
       <p:ext uri="{BB962C8B-B14F-4D97-AF65-F5344CB8AC3E}">
-        <p14:creationId xmlns:p14="http://schemas.microsoft.com/office/powerpoint/2010/main" val="2846247479"/>
+        <p14:creationId xmlns:p14="http://schemas.microsoft.com/office/powerpoint/2010/main" val="4080700659"/>
       </p:ext>
     </p:extLst>
   </p:cSld>
@@ -1158,7 +1158,7 @@
           <a:p>
             <a:fld id="{78455201-7865-8744-8A9B-9F5FC03C5C4C}" type="slidenum">
               <a:rPr lang="en-US" smtClean="0"/>
-              <a:t>12</a:t>
+              <a:t>11</a:t>
             </a:fld>
             <a:endParaRPr lang="en-US"/>
           </a:p>
@@ -1167,7 +1167,7 @@
     </p:spTree>
     <p:extLst>
       <p:ext uri="{BB962C8B-B14F-4D97-AF65-F5344CB8AC3E}">
-        <p14:creationId xmlns:p14="http://schemas.microsoft.com/office/powerpoint/2010/main" val="3370011442"/>
+        <p14:creationId xmlns:p14="http://schemas.microsoft.com/office/powerpoint/2010/main" val="2846247479"/>
       </p:ext>
     </p:extLst>
   </p:cSld>
@@ -1242,6 +1242,90 @@
           <a:p>
             <a:fld id="{78455201-7865-8744-8A9B-9F5FC03C5C4C}" type="slidenum">
               <a:rPr lang="en-US" smtClean="0"/>
+              <a:t>12</a:t>
+            </a:fld>
+            <a:endParaRPr lang="en-US"/>
+          </a:p>
+        </p:txBody>
+      </p:sp>
+    </p:spTree>
+    <p:extLst>
+      <p:ext uri="{BB962C8B-B14F-4D97-AF65-F5344CB8AC3E}">
+        <p14:creationId xmlns:p14="http://schemas.microsoft.com/office/powerpoint/2010/main" val="3370011442"/>
+      </p:ext>
+    </p:extLst>
+  </p:cSld>
+  <p:clrMapOvr>
+    <a:masterClrMapping/>
+  </p:clrMapOvr>
+</p:notes>
+</file>
+
+<file path=ppt/notesSlides/notesSlide8.xml><?xml version="1.0" encoding="utf-8"?>
+<p:notes xmlns:a="http://schemas.openxmlformats.org/drawingml/2006/main" xmlns:r="http://schemas.openxmlformats.org/officeDocument/2006/relationships" xmlns:p="http://schemas.openxmlformats.org/presentationml/2006/main">
+  <p:cSld>
+    <p:spTree>
+      <p:nvGrpSpPr>
+        <p:cNvPr id="1" name=""/>
+        <p:cNvGrpSpPr/>
+        <p:nvPr/>
+      </p:nvGrpSpPr>
+      <p:grpSpPr>
+        <a:xfrm>
+          <a:off x="0" y="0"/>
+          <a:ext cx="0" cy="0"/>
+          <a:chOff x="0" y="0"/>
+          <a:chExt cx="0" cy="0"/>
+        </a:xfrm>
+      </p:grpSpPr>
+      <p:sp>
+        <p:nvSpPr>
+          <p:cNvPr id="2" name="Slide Image Placeholder 1"/>
+          <p:cNvSpPr>
+            <a:spLocks noGrp="1" noRot="1" noChangeAspect="1"/>
+          </p:cNvSpPr>
+          <p:nvPr>
+            <p:ph type="sldImg"/>
+          </p:nvPr>
+        </p:nvSpPr>
+        <p:spPr/>
+      </p:sp>
+      <p:sp>
+        <p:nvSpPr>
+          <p:cNvPr id="3" name="Notes Placeholder 2"/>
+          <p:cNvSpPr>
+            <a:spLocks noGrp="1"/>
+          </p:cNvSpPr>
+          <p:nvPr>
+            <p:ph type="body" idx="1"/>
+          </p:nvPr>
+        </p:nvSpPr>
+        <p:spPr/>
+        <p:txBody>
+          <a:bodyPr/>
+          <a:lstStyle/>
+          <a:p>
+            <a:endParaRPr lang="en-US" dirty="0"/>
+          </a:p>
+        </p:txBody>
+      </p:sp>
+      <p:sp>
+        <p:nvSpPr>
+          <p:cNvPr id="4" name="Slide Number Placeholder 3"/>
+          <p:cNvSpPr>
+            <a:spLocks noGrp="1"/>
+          </p:cNvSpPr>
+          <p:nvPr>
+            <p:ph type="sldNum" sz="quarter" idx="5"/>
+          </p:nvPr>
+        </p:nvSpPr>
+        <p:spPr/>
+        <p:txBody>
+          <a:bodyPr/>
+          <a:lstStyle/>
+          <a:p>
+            <a:fld id="{78455201-7865-8744-8A9B-9F5FC03C5C4C}" type="slidenum">
+              <a:rPr lang="en-US" smtClean="0"/>
               <a:t>13</a:t>
             </a:fld>
             <a:endParaRPr lang="en-US"/>
@@ -1261,7 +1345,7 @@
 </p:notes>
 </file>
 
-<file path=ppt/notesSlides/notesSlide8.xml><?xml version="1.0" encoding="utf-8"?>
+<file path=ppt/notesSlides/notesSlide9.xml><?xml version="1.0" encoding="utf-8"?>
 <p:notes xmlns:a="http://schemas.openxmlformats.org/drawingml/2006/main" xmlns:r="http://schemas.openxmlformats.org/officeDocument/2006/relationships" xmlns:p="http://schemas.openxmlformats.org/presentationml/2006/main">
   <p:cSld>
     <p:spTree>
@@ -7708,7 +7792,7 @@
         <p:spPr>
           <a:xfrm>
             <a:off x="-838457" y="1891915"/>
-            <a:ext cx="28712804" cy="2677656"/>
+            <a:ext cx="28712804" cy="2308324"/>
           </a:xfrm>
           <a:prstGeom prst="rect">
             <a:avLst/>
@@ -7827,30 +7911,7 @@
                 <a:latin typeface="Consolas" panose="020B0609020204030204" pitchFamily="49" charset="0"/>
                 <a:cs typeface="Consolas" panose="020B0609020204030204" pitchFamily="49" charset="0"/>
               </a:rPr>
-              <a:t>        </a:t>
-            </a:r>
-            <a:r>
-              <a:rPr lang="en-GB" sz="2400" b="1" dirty="0">
-                <a:latin typeface="Consolas" panose="020B0609020204030204" pitchFamily="49" charset="0"/>
-                <a:cs typeface="Consolas" panose="020B0609020204030204" pitchFamily="49" charset="0"/>
-              </a:rPr>
-              <a:t>// Cut unphysical params as last resort   </a:t>
-            </a:r>
-            <a:r>
-              <a:rPr lang="en-GB" sz="2400" dirty="0">
-                <a:latin typeface="Consolas" panose="020B0609020204030204" pitchFamily="49" charset="0"/>
-                <a:cs typeface="Consolas" panose="020B0609020204030204" pitchFamily="49" charset="0"/>
-              </a:rPr>
-              <a:t>                                                                                                  </a:t>
-            </a:r>
-          </a:p>
-          <a:p>
-            <a:r>
-              <a:rPr lang="en-GB" sz="2400" dirty="0">
-                <a:latin typeface="Consolas" panose="020B0609020204030204" pitchFamily="49" charset="0"/>
-                <a:cs typeface="Consolas" panose="020B0609020204030204" pitchFamily="49" charset="0"/>
-              </a:rPr>
-              <a:t>        if(tau &gt; 25 || A &gt; 0.1) continue;</a:t>
+              <a:t>     </a:t>
             </a:r>
           </a:p>
         </p:txBody>
@@ -8239,47 +8300,17 @@
                   <a:schemeClr val="bg1"/>
                 </a:solidFill>
               </a:rPr>
-              <a:t>Cuts Illustration (Pull)</a:t>
+              <a:t>Cuts Illustration (1D Distributions)</a:t>
             </a:r>
           </a:p>
         </p:txBody>
       </p:sp>
       <p:pic>
         <p:nvPicPr>
-          <p:cNvPr id="30" name="Picture 29" descr="A screenshot of a cell phone&#10;&#10;Description automatically generated">
+          <p:cNvPr id="31" name="Picture 30" descr="A close up of text on a white background&#10;&#10;Description automatically generated">
             <a:extLst>
               <a:ext uri="{FF2B5EF4-FFF2-40B4-BE49-F238E27FC236}">
-                <a16:creationId xmlns:a16="http://schemas.microsoft.com/office/drawing/2014/main" id="{DEC74823-43DC-F64C-9782-5A08388788EC}"/>
-              </a:ext>
-            </a:extLst>
-          </p:cNvPr>
-          <p:cNvPicPr>
-            <a:picLocks noChangeAspect="1"/>
-          </p:cNvPicPr>
-          <p:nvPr/>
-        </p:nvPicPr>
-        <p:blipFill>
-          <a:blip r:embed="rId2"/>
-          <a:stretch>
-            <a:fillRect/>
-          </a:stretch>
-        </p:blipFill>
-        <p:spPr>
-          <a:xfrm>
-            <a:off x="900000" y="792000"/>
-            <a:ext cx="3324443" cy="2159999"/>
-          </a:xfrm>
-          <a:prstGeom prst="rect">
-            <a:avLst/>
-          </a:prstGeom>
-        </p:spPr>
-      </p:pic>
-      <p:pic>
-        <p:nvPicPr>
-          <p:cNvPr id="32" name="Picture 31" descr="A screenshot of a cell phone&#10;&#10;Description automatically generated">
-            <a:extLst>
-              <a:ext uri="{FF2B5EF4-FFF2-40B4-BE49-F238E27FC236}">
-                <a16:creationId xmlns:a16="http://schemas.microsoft.com/office/drawing/2014/main" id="{36BEE782-35A9-174F-B57C-9B3AD8EE08BD}"/>
+                <a16:creationId xmlns:a16="http://schemas.microsoft.com/office/drawing/2014/main" id="{9E240492-D58E-7A45-AF44-A2EFD12DB3BF}"/>
               </a:ext>
             </a:extLst>
           </p:cNvPr>
@@ -8296,8 +8327,8 @@
         </p:blipFill>
         <p:spPr>
           <a:xfrm>
-            <a:off x="900000" y="2952000"/>
-            <a:ext cx="3324444" cy="2160000"/>
+            <a:off x="4517164" y="1208833"/>
+            <a:ext cx="4432592" cy="2880000"/>
           </a:xfrm>
           <a:prstGeom prst="rect">
             <a:avLst/>
@@ -8306,10 +8337,10 @@
       </p:pic>
       <p:pic>
         <p:nvPicPr>
-          <p:cNvPr id="34" name="Picture 33" descr="A screenshot of a cell phone&#10;&#10;Description automatically generated">
+          <p:cNvPr id="33" name="Picture 32" descr="A close up of text on a white background&#10;&#10;Description automatically generated">
             <a:extLst>
               <a:ext uri="{FF2B5EF4-FFF2-40B4-BE49-F238E27FC236}">
-                <a16:creationId xmlns:a16="http://schemas.microsoft.com/office/drawing/2014/main" id="{EAFE7D24-5029-0842-82F0-E2715D1AE66B}"/>
+                <a16:creationId xmlns:a16="http://schemas.microsoft.com/office/drawing/2014/main" id="{78379F02-DBFF-114F-96B9-0D0863C0BC45}"/>
               </a:ext>
             </a:extLst>
           </p:cNvPr>
@@ -8326,38 +8357,8 @@
         </p:blipFill>
         <p:spPr>
           <a:xfrm>
-            <a:off x="4860000" y="792000"/>
-            <a:ext cx="3324444" cy="2160000"/>
-          </a:xfrm>
-          <a:prstGeom prst="rect">
-            <a:avLst/>
-          </a:prstGeom>
-        </p:spPr>
-      </p:pic>
-      <p:pic>
-        <p:nvPicPr>
-          <p:cNvPr id="36" name="Picture 35" descr="A screenshot of a social media post&#10;&#10;Description automatically generated">
-            <a:extLst>
-              <a:ext uri="{FF2B5EF4-FFF2-40B4-BE49-F238E27FC236}">
-                <a16:creationId xmlns:a16="http://schemas.microsoft.com/office/drawing/2014/main" id="{9EE2442A-3F14-AB43-BADF-21FA7D7A78DD}"/>
-              </a:ext>
-            </a:extLst>
-          </p:cNvPr>
-          <p:cNvPicPr>
-            <a:picLocks noChangeAspect="1"/>
-          </p:cNvPicPr>
-          <p:nvPr/>
-        </p:nvPicPr>
-        <p:blipFill>
-          <a:blip r:embed="rId5"/>
-          <a:stretch>
-            <a:fillRect/>
-          </a:stretch>
-        </p:blipFill>
-        <p:spPr>
-          <a:xfrm>
-            <a:off x="4860000" y="2952000"/>
-            <a:ext cx="3324444" cy="2160000"/>
+            <a:off x="207022" y="1208833"/>
+            <a:ext cx="4432592" cy="2880000"/>
           </a:xfrm>
           <a:prstGeom prst="rect">
             <a:avLst/>
@@ -8367,7 +8368,7 @@
     </p:spTree>
     <p:extLst>
       <p:ext uri="{BB962C8B-B14F-4D97-AF65-F5344CB8AC3E}">
-        <p14:creationId xmlns:p14="http://schemas.microsoft.com/office/powerpoint/2010/main" val="4253472782"/>
+        <p14:creationId xmlns:p14="http://schemas.microsoft.com/office/powerpoint/2010/main" val="1414531218"/>
       </p:ext>
     </p:extLst>
   </p:cSld>
@@ -8705,135 +8706,15 @@
                   <a:schemeClr val="bg1"/>
                 </a:solidFill>
               </a:rPr>
-              <a:t>Cuts Illustration (Fractional Uncertainty)</a:t>
-            </a:r>
-          </a:p>
-        </p:txBody>
-      </p:sp>
-      <p:pic>
-        <p:nvPicPr>
-          <p:cNvPr id="4" name="Picture 3" descr="A screenshot of a cell phone&#10;&#10;Description automatically generated">
-            <a:extLst>
-              <a:ext uri="{FF2B5EF4-FFF2-40B4-BE49-F238E27FC236}">
-                <a16:creationId xmlns:a16="http://schemas.microsoft.com/office/drawing/2014/main" id="{9376E91A-5A5E-B242-A4CF-A22E7B0DA5C7}"/>
-              </a:ext>
-            </a:extLst>
-          </p:cNvPr>
-          <p:cNvPicPr>
-            <a:picLocks noChangeAspect="1"/>
-          </p:cNvPicPr>
-          <p:nvPr/>
-        </p:nvPicPr>
-        <p:blipFill>
-          <a:blip r:embed="rId2"/>
-          <a:stretch>
-            <a:fillRect/>
-          </a:stretch>
-        </p:blipFill>
-        <p:spPr>
-          <a:xfrm>
-            <a:off x="900000" y="792000"/>
-            <a:ext cx="3324444" cy="2160000"/>
-          </a:xfrm>
-          <a:prstGeom prst="rect">
-            <a:avLst/>
-          </a:prstGeom>
-        </p:spPr>
-      </p:pic>
-      <p:pic>
-        <p:nvPicPr>
-          <p:cNvPr id="6" name="Picture 5" descr="A screenshot of a social media post&#10;&#10;Description automatically generated">
-            <a:extLst>
-              <a:ext uri="{FF2B5EF4-FFF2-40B4-BE49-F238E27FC236}">
-                <a16:creationId xmlns:a16="http://schemas.microsoft.com/office/drawing/2014/main" id="{7035D59C-AF86-5942-8A14-805B1820B8E3}"/>
-              </a:ext>
-            </a:extLst>
-          </p:cNvPr>
-          <p:cNvPicPr>
-            <a:picLocks noChangeAspect="1"/>
-          </p:cNvPicPr>
-          <p:nvPr/>
-        </p:nvPicPr>
-        <p:blipFill>
-          <a:blip r:embed="rId3"/>
-          <a:stretch>
-            <a:fillRect/>
-          </a:stretch>
-        </p:blipFill>
-        <p:spPr>
-          <a:xfrm>
-            <a:off x="900000" y="2952000"/>
-            <a:ext cx="3324444" cy="2160000"/>
-          </a:xfrm>
-          <a:prstGeom prst="rect">
-            <a:avLst/>
-          </a:prstGeom>
-        </p:spPr>
-      </p:pic>
-      <p:pic>
-        <p:nvPicPr>
-          <p:cNvPr id="10" name="Picture 9" descr="A screenshot of a cell phone&#10;&#10;Description automatically generated">
-            <a:extLst>
-              <a:ext uri="{FF2B5EF4-FFF2-40B4-BE49-F238E27FC236}">
-                <a16:creationId xmlns:a16="http://schemas.microsoft.com/office/drawing/2014/main" id="{71998EB9-0621-014A-8B40-206258BC19DE}"/>
-              </a:ext>
-            </a:extLst>
-          </p:cNvPr>
-          <p:cNvPicPr>
-            <a:picLocks noChangeAspect="1"/>
-          </p:cNvPicPr>
-          <p:nvPr/>
-        </p:nvPicPr>
-        <p:blipFill>
-          <a:blip r:embed="rId4"/>
-          <a:stretch>
-            <a:fillRect/>
-          </a:stretch>
-        </p:blipFill>
-        <p:spPr>
-          <a:xfrm>
-            <a:off x="4860000" y="792000"/>
-            <a:ext cx="3324444" cy="2160000"/>
-          </a:xfrm>
-          <a:prstGeom prst="rect">
-            <a:avLst/>
-          </a:prstGeom>
-        </p:spPr>
-      </p:pic>
-      <p:pic>
-        <p:nvPicPr>
-          <p:cNvPr id="12" name="Picture 11" descr="A screenshot of a social media post&#10;&#10;Description automatically generated">
-            <a:extLst>
-              <a:ext uri="{FF2B5EF4-FFF2-40B4-BE49-F238E27FC236}">
-                <a16:creationId xmlns:a16="http://schemas.microsoft.com/office/drawing/2014/main" id="{217E0DAC-770D-6343-AF55-E391A1876F80}"/>
-              </a:ext>
-            </a:extLst>
-          </p:cNvPr>
-          <p:cNvPicPr>
-            <a:picLocks noChangeAspect="1"/>
-          </p:cNvPicPr>
-          <p:nvPr/>
-        </p:nvPicPr>
-        <p:blipFill>
-          <a:blip r:embed="rId5"/>
-          <a:stretch>
-            <a:fillRect/>
-          </a:stretch>
-        </p:blipFill>
-        <p:spPr>
-          <a:xfrm>
-            <a:off x="4860000" y="2952000"/>
-            <a:ext cx="3324444" cy="2160000"/>
-          </a:xfrm>
-          <a:prstGeom prst="rect">
-            <a:avLst/>
-          </a:prstGeom>
-        </p:spPr>
-      </p:pic>
+              <a:t>Cuts Illustration (Pull)</a:t>
+            </a:r>
+          </a:p>
+        </p:txBody>
+      </p:sp>
     </p:spTree>
     <p:extLst>
       <p:ext uri="{BB962C8B-B14F-4D97-AF65-F5344CB8AC3E}">
-        <p14:creationId xmlns:p14="http://schemas.microsoft.com/office/powerpoint/2010/main" val="2072168888"/>
+        <p14:creationId xmlns:p14="http://schemas.microsoft.com/office/powerpoint/2010/main" val="4253472782"/>
       </p:ext>
     </p:extLst>
   </p:cSld>
@@ -9171,75 +9052,15 @@
                   <a:schemeClr val="bg1"/>
                 </a:solidFill>
               </a:rPr>
-              <a:t>Cuts Illustration (1D Distributions)</a:t>
-            </a:r>
-          </a:p>
-        </p:txBody>
-      </p:sp>
-      <p:pic>
-        <p:nvPicPr>
-          <p:cNvPr id="16" name="Picture 15" descr="A screenshot of a cell phone&#10;&#10;Description automatically generated">
-            <a:extLst>
-              <a:ext uri="{FF2B5EF4-FFF2-40B4-BE49-F238E27FC236}">
-                <a16:creationId xmlns:a16="http://schemas.microsoft.com/office/drawing/2014/main" id="{929CE76D-D002-044E-9C13-1DC99813E40F}"/>
-              </a:ext>
-            </a:extLst>
-          </p:cNvPr>
-          <p:cNvPicPr>
-            <a:picLocks noChangeAspect="1"/>
-          </p:cNvPicPr>
-          <p:nvPr/>
-        </p:nvPicPr>
-        <p:blipFill>
-          <a:blip r:embed="rId2"/>
-          <a:stretch>
-            <a:fillRect/>
-          </a:stretch>
-        </p:blipFill>
-        <p:spPr>
-          <a:xfrm>
-            <a:off x="139408" y="1242011"/>
-            <a:ext cx="4432592" cy="2880000"/>
-          </a:xfrm>
-          <a:prstGeom prst="rect">
-            <a:avLst/>
-          </a:prstGeom>
-        </p:spPr>
-      </p:pic>
-      <p:pic>
-        <p:nvPicPr>
-          <p:cNvPr id="21" name="Picture 20" descr="A screenshot of a cell phone&#10;&#10;Description automatically generated">
-            <a:extLst>
-              <a:ext uri="{FF2B5EF4-FFF2-40B4-BE49-F238E27FC236}">
-                <a16:creationId xmlns:a16="http://schemas.microsoft.com/office/drawing/2014/main" id="{68670112-BC2B-A540-BCF0-B05CE158BB49}"/>
-              </a:ext>
-            </a:extLst>
-          </p:cNvPr>
-          <p:cNvPicPr>
-            <a:picLocks noChangeAspect="1"/>
-          </p:cNvPicPr>
-          <p:nvPr/>
-        </p:nvPicPr>
-        <p:blipFill>
-          <a:blip r:embed="rId3"/>
-          <a:stretch>
-            <a:fillRect/>
-          </a:stretch>
-        </p:blipFill>
-        <p:spPr>
-          <a:xfrm>
-            <a:off x="4510775" y="1250488"/>
-            <a:ext cx="4432592" cy="2880000"/>
-          </a:xfrm>
-          <a:prstGeom prst="rect">
-            <a:avLst/>
-          </a:prstGeom>
-        </p:spPr>
-      </p:pic>
+              <a:t>Cuts Illustration (Fractional Uncertainty)</a:t>
+            </a:r>
+          </a:p>
+        </p:txBody>
+      </p:sp>
     </p:spTree>
     <p:extLst>
       <p:ext uri="{BB962C8B-B14F-4D97-AF65-F5344CB8AC3E}">
-        <p14:creationId xmlns:p14="http://schemas.microsoft.com/office/powerpoint/2010/main" val="1414531218"/>
+        <p14:creationId xmlns:p14="http://schemas.microsoft.com/office/powerpoint/2010/main" val="2072168888"/>
       </p:ext>
     </p:extLst>
   </p:cSld>

</xml_diff>